<commit_message>
fix: 🐛 update orm 03 session
</commit_message>
<xml_diff>
--- a/orm/orm-03.pptx
+++ b/orm/orm-03.pptx
@@ -5,13 +5,16 @@
     <p:sldMasterId id="2147483705" r:id="rId1"/>
   </p:sldMasterIdLst>
   <p:notesMasterIdLst>
-    <p:notesMasterId r:id="rId6"/>
+    <p:notesMasterId r:id="rId9"/>
   </p:notesMasterIdLst>
   <p:sldIdLst>
     <p:sldId id="259" r:id="rId2"/>
     <p:sldId id="295" r:id="rId3"/>
     <p:sldId id="296" r:id="rId4"/>
     <p:sldId id="297" r:id="rId5"/>
+    <p:sldId id="299" r:id="rId6"/>
+    <p:sldId id="300" r:id="rId7"/>
+    <p:sldId id="298" r:id="rId8"/>
   </p:sldIdLst>
   <p:sldSz cx="12192000" cy="6858000"/>
   <p:notesSz cx="6858000" cy="9144000"/>
@@ -200,7 +203,7 @@
           <a:p>
             <a:fld id="{9B9ECB28-6A22-4037-9487-F3F739F744D6}" type="datetimeFigureOut">
               <a:rPr lang="en-US" smtClean="0"/>
-              <a:t>12/24/2021</a:t>
+              <a:t>12/26/2021</a:t>
             </a:fld>
             <a:endParaRPr lang="en-US"/>
           </a:p>
@@ -467,6 +470,182 @@
 </p:notesMaster>
 </file>
 
+<file path=ppt/notesSlides/notesSlide1.xml><?xml version="1.0" encoding="utf-8"?>
+<p:notes xmlns:a="http://schemas.openxmlformats.org/drawingml/2006/main" xmlns:r="http://schemas.openxmlformats.org/officeDocument/2006/relationships" xmlns:p="http://schemas.openxmlformats.org/presentationml/2006/main">
+  <p:cSld>
+    <p:spTree>
+      <p:nvGrpSpPr>
+        <p:cNvPr id="1" name=""/>
+        <p:cNvGrpSpPr/>
+        <p:nvPr/>
+      </p:nvGrpSpPr>
+      <p:grpSpPr>
+        <a:xfrm>
+          <a:off x="0" y="0"/>
+          <a:ext cx="0" cy="0"/>
+          <a:chOff x="0" y="0"/>
+          <a:chExt cx="0" cy="0"/>
+        </a:xfrm>
+      </p:grpSpPr>
+      <p:sp>
+        <p:nvSpPr>
+          <p:cNvPr id="2" name="Slide Image Placeholder 1"/>
+          <p:cNvSpPr>
+            <a:spLocks noGrp="1" noRot="1" noChangeAspect="1"/>
+          </p:cNvSpPr>
+          <p:nvPr>
+            <p:ph type="sldImg"/>
+          </p:nvPr>
+        </p:nvSpPr>
+        <p:spPr/>
+      </p:sp>
+      <p:sp>
+        <p:nvSpPr>
+          <p:cNvPr id="3" name="Notes Placeholder 2"/>
+          <p:cNvSpPr>
+            <a:spLocks noGrp="1"/>
+          </p:cNvSpPr>
+          <p:nvPr>
+            <p:ph type="body" idx="1"/>
+          </p:nvPr>
+        </p:nvSpPr>
+        <p:spPr/>
+        <p:txBody>
+          <a:bodyPr/>
+          <a:lstStyle/>
+          <a:p>
+            <a:r>
+              <a:rPr lang="en-US" dirty="0"/>
+              <a:t>https://orkhan.gitbook.io/typeorm/docs/find-options</a:t>
+            </a:r>
+            <a:endParaRPr lang="fa-IR" dirty="0"/>
+          </a:p>
+        </p:txBody>
+      </p:sp>
+      <p:sp>
+        <p:nvSpPr>
+          <p:cNvPr id="4" name="Slide Number Placeholder 3"/>
+          <p:cNvSpPr>
+            <a:spLocks noGrp="1"/>
+          </p:cNvSpPr>
+          <p:nvPr>
+            <p:ph type="sldNum" sz="quarter" idx="5"/>
+          </p:nvPr>
+        </p:nvSpPr>
+        <p:spPr/>
+        <p:txBody>
+          <a:bodyPr/>
+          <a:lstStyle/>
+          <a:p>
+            <a:fld id="{0FE84E6F-3671-472C-BE6F-A37BC298F4AB}" type="slidenum">
+              <a:rPr lang="en-US" smtClean="0"/>
+              <a:t>5</a:t>
+            </a:fld>
+            <a:endParaRPr lang="en-US"/>
+          </a:p>
+        </p:txBody>
+      </p:sp>
+    </p:spTree>
+    <p:extLst>
+      <p:ext uri="{BB962C8B-B14F-4D97-AF65-F5344CB8AC3E}">
+        <p14:creationId xmlns:p14="http://schemas.microsoft.com/office/powerpoint/2010/main" val="1942430010"/>
+      </p:ext>
+    </p:extLst>
+  </p:cSld>
+  <p:clrMapOvr>
+    <a:masterClrMapping/>
+  </p:clrMapOvr>
+</p:notes>
+</file>
+
+<file path=ppt/notesSlides/notesSlide2.xml><?xml version="1.0" encoding="utf-8"?>
+<p:notes xmlns:a="http://schemas.openxmlformats.org/drawingml/2006/main" xmlns:r="http://schemas.openxmlformats.org/officeDocument/2006/relationships" xmlns:p="http://schemas.openxmlformats.org/presentationml/2006/main">
+  <p:cSld>
+    <p:spTree>
+      <p:nvGrpSpPr>
+        <p:cNvPr id="1" name=""/>
+        <p:cNvGrpSpPr/>
+        <p:nvPr/>
+      </p:nvGrpSpPr>
+      <p:grpSpPr>
+        <a:xfrm>
+          <a:off x="0" y="0"/>
+          <a:ext cx="0" cy="0"/>
+          <a:chOff x="0" y="0"/>
+          <a:chExt cx="0" cy="0"/>
+        </a:xfrm>
+      </p:grpSpPr>
+      <p:sp>
+        <p:nvSpPr>
+          <p:cNvPr id="2" name="Slide Image Placeholder 1"/>
+          <p:cNvSpPr>
+            <a:spLocks noGrp="1" noRot="1" noChangeAspect="1"/>
+          </p:cNvSpPr>
+          <p:nvPr>
+            <p:ph type="sldImg"/>
+          </p:nvPr>
+        </p:nvSpPr>
+        <p:spPr/>
+      </p:sp>
+      <p:sp>
+        <p:nvSpPr>
+          <p:cNvPr id="3" name="Notes Placeholder 2"/>
+          <p:cNvSpPr>
+            <a:spLocks noGrp="1"/>
+          </p:cNvSpPr>
+          <p:nvPr>
+            <p:ph type="body" idx="1"/>
+          </p:nvPr>
+        </p:nvSpPr>
+        <p:spPr/>
+        <p:txBody>
+          <a:bodyPr/>
+          <a:lstStyle/>
+          <a:p>
+            <a:r>
+              <a:rPr lang="en-US" dirty="0"/>
+              <a:t>https://orkhan.gitbook.io/typeorm/docs/select-query-builder</a:t>
+            </a:r>
+            <a:endParaRPr lang="fa-IR" dirty="0"/>
+          </a:p>
+        </p:txBody>
+      </p:sp>
+      <p:sp>
+        <p:nvSpPr>
+          <p:cNvPr id="4" name="Slide Number Placeholder 3"/>
+          <p:cNvSpPr>
+            <a:spLocks noGrp="1"/>
+          </p:cNvSpPr>
+          <p:nvPr>
+            <p:ph type="sldNum" sz="quarter" idx="5"/>
+          </p:nvPr>
+        </p:nvSpPr>
+        <p:spPr/>
+        <p:txBody>
+          <a:bodyPr/>
+          <a:lstStyle/>
+          <a:p>
+            <a:fld id="{0FE84E6F-3671-472C-BE6F-A37BC298F4AB}" type="slidenum">
+              <a:rPr lang="en-US" smtClean="0"/>
+              <a:t>6</a:t>
+            </a:fld>
+            <a:endParaRPr lang="en-US"/>
+          </a:p>
+        </p:txBody>
+      </p:sp>
+    </p:spTree>
+    <p:extLst>
+      <p:ext uri="{BB962C8B-B14F-4D97-AF65-F5344CB8AC3E}">
+        <p14:creationId xmlns:p14="http://schemas.microsoft.com/office/powerpoint/2010/main" val="3009885762"/>
+      </p:ext>
+    </p:extLst>
+  </p:cSld>
+  <p:clrMapOvr>
+    <a:masterClrMapping/>
+  </p:clrMapOvr>
+</p:notes>
+</file>
+
 <file path=ppt/slideLayouts/slideLayout1.xml><?xml version="1.0" encoding="utf-8"?>
 <p:sldLayout xmlns:a="http://schemas.openxmlformats.org/drawingml/2006/main" xmlns:r="http://schemas.openxmlformats.org/officeDocument/2006/relationships" xmlns:p="http://schemas.openxmlformats.org/presentationml/2006/main" type="title" preserve="1">
   <p:cSld name="Title Slide">
@@ -651,7 +830,7 @@
           <a:p>
             <a:fld id="{04292BB3-D7FE-4490-A369-7BA9FA0F2D7D}" type="datetime1">
               <a:rPr lang="en-US" smtClean="0"/>
-              <a:t>12/24/2021</a:t>
+              <a:t>12/26/2021</a:t>
             </a:fld>
             <a:endParaRPr lang="en-US" dirty="0"/>
           </a:p>
@@ -960,7 +1139,7 @@
           <a:p>
             <a:fld id="{71430156-F29C-46EC-A871-806AE8294476}" type="datetime1">
               <a:rPr lang="en-US" smtClean="0"/>
-              <a:t>12/24/2021</a:t>
+              <a:t>12/26/2021</a:t>
             </a:fld>
             <a:endParaRPr lang="en-US" dirty="0"/>
           </a:p>
@@ -1158,7 +1337,7 @@
           <a:p>
             <a:fld id="{452C1D77-010B-4F6F-9888-C3320C9E1C83}" type="datetime1">
               <a:rPr lang="en-US" smtClean="0"/>
-              <a:t>12/24/2021</a:t>
+              <a:t>12/26/2021</a:t>
             </a:fld>
             <a:endParaRPr lang="en-US" dirty="0"/>
           </a:p>
@@ -1425,7 +1604,7 @@
           <a:p>
             <a:fld id="{5FE0F86D-F97D-48BB-BD0F-99F6CE010ADF}" type="datetime1">
               <a:rPr lang="en-US" smtClean="0"/>
-              <a:t>12/24/2021</a:t>
+              <a:t>12/26/2021</a:t>
             </a:fld>
             <a:endParaRPr lang="en-US" dirty="0"/>
           </a:p>
@@ -1865,7 +2044,7 @@
           <a:p>
             <a:fld id="{223B543A-94C7-4785-BA8F-D2DF664B813B}" type="datetime1">
               <a:rPr lang="en-US" smtClean="0"/>
-              <a:t>12/24/2021</a:t>
+              <a:t>12/26/2021</a:t>
             </a:fld>
             <a:endParaRPr lang="en-US" dirty="0"/>
           </a:p>
@@ -2406,7 +2585,7 @@
           <a:p>
             <a:fld id="{C6188102-512C-443F-80D2-B8F38A68E8E0}" type="datetime1">
               <a:rPr lang="en-US" smtClean="0"/>
-              <a:t>12/24/2021</a:t>
+              <a:t>12/26/2021</a:t>
             </a:fld>
             <a:endParaRPr lang="en-US" dirty="0"/>
           </a:p>
@@ -3292,7 +3471,7 @@
           <a:p>
             <a:fld id="{D6E94816-01EF-4877-B644-9B335C39E9B1}" type="datetime1">
               <a:rPr lang="en-US" smtClean="0"/>
-              <a:t>12/24/2021</a:t>
+              <a:t>12/26/2021</a:t>
             </a:fld>
             <a:endParaRPr lang="en-US" dirty="0"/>
           </a:p>
@@ -3466,7 +3645,7 @@
           <a:p>
             <a:fld id="{2F4AFB9C-1CA0-4C59-AF85-2C64F7A24A2B}" type="datetime1">
               <a:rPr lang="en-US" smtClean="0"/>
-              <a:t>12/24/2021</a:t>
+              <a:t>12/26/2021</a:t>
             </a:fld>
             <a:endParaRPr lang="en-US" dirty="0"/>
           </a:p>
@@ -3654,7 +3833,7 @@
           <a:p>
             <a:fld id="{C2849F83-4F55-4CEC-BF3D-4AB5FE85918E}" type="datetime1">
               <a:rPr lang="en-US" smtClean="0"/>
-              <a:t>12/24/2021</a:t>
+              <a:t>12/26/2021</a:t>
             </a:fld>
             <a:endParaRPr lang="en-US" dirty="0"/>
           </a:p>
@@ -3828,7 +4007,7 @@
           <a:p>
             <a:fld id="{7CE8E275-0A33-4735-B717-275101F6E22C}" type="datetime1">
               <a:rPr lang="en-US" smtClean="0"/>
-              <a:t>12/24/2021</a:t>
+              <a:t>12/26/2021</a:t>
             </a:fld>
             <a:endParaRPr lang="en-US" dirty="0"/>
           </a:p>
@@ -4076,7 +4255,7 @@
           <a:p>
             <a:fld id="{11DE1D34-5930-414B-861A-C08DBE059BCD}" type="datetime1">
               <a:rPr lang="en-US" smtClean="0"/>
-              <a:t>12/24/2021</a:t>
+              <a:t>12/26/2021</a:t>
             </a:fld>
             <a:endParaRPr lang="en-US" dirty="0"/>
           </a:p>
@@ -4322,7 +4501,7 @@
           <a:p>
             <a:fld id="{1F0B5F0E-C69B-493D-BC11-8AC8D8992B44}" type="datetime1">
               <a:rPr lang="en-US" smtClean="0"/>
-              <a:t>12/24/2021</a:t>
+              <a:t>12/26/2021</a:t>
             </a:fld>
             <a:endParaRPr lang="en-US" dirty="0"/>
           </a:p>
@@ -4809,7 +4988,7 @@
           <a:p>
             <a:fld id="{B5172908-172A-4EC8-B0B5-05FD12C13D2A}" type="datetime1">
               <a:rPr lang="en-US" smtClean="0"/>
-              <a:t>12/24/2021</a:t>
+              <a:t>12/26/2021</a:t>
             </a:fld>
             <a:endParaRPr lang="en-US" dirty="0"/>
           </a:p>
@@ -4931,7 +5110,7 @@
           <a:p>
             <a:fld id="{1C7364DF-3607-4A5A-AB83-404A3BB8D335}" type="datetime1">
               <a:rPr lang="en-US" smtClean="0"/>
-              <a:t>12/24/2021</a:t>
+              <a:t>12/26/2021</a:t>
             </a:fld>
             <a:endParaRPr lang="en-US" dirty="0"/>
           </a:p>
@@ -5030,7 +5209,7 @@
           <a:p>
             <a:fld id="{AC157155-FDF4-4485-AFEF-D9170575ED26}" type="datetime1">
               <a:rPr lang="en-US" smtClean="0"/>
-              <a:t>12/24/2021</a:t>
+              <a:t>12/26/2021</a:t>
             </a:fld>
             <a:endParaRPr lang="en-US" dirty="0"/>
           </a:p>
@@ -5289,7 +5468,7 @@
           <a:p>
             <a:fld id="{4E0CDAD6-4FF7-4455-A473-3E54CC5E4B8D}" type="datetime1">
               <a:rPr lang="en-US" smtClean="0"/>
-              <a:t>12/24/2021</a:t>
+              <a:t>12/26/2021</a:t>
             </a:fld>
             <a:endParaRPr lang="en-US" dirty="0"/>
           </a:p>
@@ -5600,7 +5779,7 @@
           <a:p>
             <a:fld id="{14F360E8-6D9C-4BF1-AB66-4049DE6B2F72}" type="datetime1">
               <a:rPr lang="en-US" smtClean="0"/>
-              <a:t>12/24/2021</a:t>
+              <a:t>12/26/2021</a:t>
             </a:fld>
             <a:endParaRPr lang="en-US" dirty="0"/>
           </a:p>
@@ -5837,7 +6016,7 @@
           <a:p>
             <a:fld id="{67EFE8E3-5D3D-4D11-AF9A-841EFA9359C2}" type="datetime1">
               <a:rPr lang="en-US" smtClean="0"/>
-              <a:t>12/24/2021</a:t>
+              <a:t>12/26/2021</a:t>
             </a:fld>
             <a:endParaRPr lang="en-US" dirty="0"/>
           </a:p>
@@ -7145,7 +7324,9 @@
         </p:nvSpPr>
         <p:spPr/>
         <p:txBody>
-          <a:bodyPr/>
+          <a:bodyPr>
+            <a:normAutofit/>
+          </a:bodyPr>
           <a:lstStyle/>
           <a:p>
             <a:r>
@@ -7171,10 +7352,9 @@
           <a:p>
             <a:pPr lvl="1"/>
             <a:r>
-              <a:rPr lang="en-US" dirty="0" err="1"/>
-              <a:t>queryBuilder</a:t>
-            </a:r>
-            <a:endParaRPr lang="en-US" dirty="0"/>
+              <a:rPr lang="en-US" dirty="0"/>
+              <a:t>Find options:</a:t>
+            </a:r>
           </a:p>
           <a:p>
             <a:pPr lvl="2"/>
@@ -7187,7 +7367,7 @@
             <a:pPr lvl="2"/>
             <a:r>
               <a:rPr lang="en-US" dirty="0"/>
-              <a:t>where</a:t>
+              <a:t>relations</a:t>
             </a:r>
           </a:p>
           <a:p>
@@ -7199,19 +7379,7 @@
           </a:p>
           <a:p>
             <a:pPr lvl="2"/>
-            <a:r>
-              <a:rPr lang="en-US" dirty="0" err="1"/>
-              <a:t>getOne</a:t>
-            </a:r>
-            <a:endParaRPr lang="en-US" dirty="0"/>
-          </a:p>
-          <a:p>
-            <a:pPr lvl="2"/>
-            <a:r>
-              <a:rPr lang="en-US" dirty="0" err="1"/>
-              <a:t>getMany</a:t>
-            </a:r>
-            <a:endParaRPr lang="fa-IR" dirty="0"/>
+            <a:endParaRPr lang="en-US" dirty="0"/>
           </a:p>
         </p:txBody>
       </p:sp>
@@ -7277,6 +7445,674 @@
     <p:extLst>
       <p:ext uri="{BB962C8B-B14F-4D97-AF65-F5344CB8AC3E}">
         <p14:creationId xmlns:p14="http://schemas.microsoft.com/office/powerpoint/2010/main" val="3833347672"/>
+      </p:ext>
+    </p:extLst>
+  </p:cSld>
+  <p:clrMapOvr>
+    <a:masterClrMapping/>
+  </p:clrMapOvr>
+</p:sld>
+</file>
+
+<file path=ppt/slides/slide5.xml><?xml version="1.0" encoding="utf-8"?>
+<p:sld xmlns:a="http://schemas.openxmlformats.org/drawingml/2006/main" xmlns:r="http://schemas.openxmlformats.org/officeDocument/2006/relationships" xmlns:p="http://schemas.openxmlformats.org/presentationml/2006/main">
+  <p:cSld>
+    <p:spTree>
+      <p:nvGrpSpPr>
+        <p:cNvPr id="1" name=""/>
+        <p:cNvGrpSpPr/>
+        <p:nvPr/>
+      </p:nvGrpSpPr>
+      <p:grpSpPr>
+        <a:xfrm>
+          <a:off x="0" y="0"/>
+          <a:ext cx="0" cy="0"/>
+          <a:chOff x="0" y="0"/>
+          <a:chExt cx="0" cy="0"/>
+        </a:xfrm>
+      </p:grpSpPr>
+      <p:sp>
+        <p:nvSpPr>
+          <p:cNvPr id="2" name="Title 1">
+            <a:extLst>
+              <a:ext uri="{FF2B5EF4-FFF2-40B4-BE49-F238E27FC236}">
+                <a16:creationId xmlns:a16="http://schemas.microsoft.com/office/drawing/2014/main" id="{65DB4300-53CF-46F9-B094-2D77F95FBAB8}"/>
+              </a:ext>
+            </a:extLst>
+          </p:cNvPr>
+          <p:cNvSpPr>
+            <a:spLocks noGrp="1"/>
+          </p:cNvSpPr>
+          <p:nvPr>
+            <p:ph type="title"/>
+          </p:nvPr>
+        </p:nvSpPr>
+        <p:spPr/>
+        <p:txBody>
+          <a:bodyPr/>
+          <a:lstStyle/>
+          <a:p>
+            <a:r>
+              <a:rPr lang="en-US" dirty="0"/>
+              <a:t>Demo</a:t>
+            </a:r>
+            <a:endParaRPr lang="fa-IR" dirty="0"/>
+          </a:p>
+        </p:txBody>
+      </p:sp>
+      <p:sp>
+        <p:nvSpPr>
+          <p:cNvPr id="3" name="Content Placeholder 2">
+            <a:extLst>
+              <a:ext uri="{FF2B5EF4-FFF2-40B4-BE49-F238E27FC236}">
+                <a16:creationId xmlns:a16="http://schemas.microsoft.com/office/drawing/2014/main" id="{633782B3-F013-4157-BFD2-7E298ED43507}"/>
+              </a:ext>
+            </a:extLst>
+          </p:cNvPr>
+          <p:cNvSpPr>
+            <a:spLocks noGrp="1"/>
+          </p:cNvSpPr>
+          <p:nvPr>
+            <p:ph idx="1"/>
+          </p:nvPr>
+        </p:nvSpPr>
+        <p:spPr/>
+        <p:txBody>
+          <a:bodyPr/>
+          <a:lstStyle/>
+          <a:p>
+            <a:r>
+              <a:rPr lang="en-US" dirty="0"/>
+              <a:t>Fetch</a:t>
+            </a:r>
+          </a:p>
+          <a:p>
+            <a:pPr lvl="1"/>
+            <a:r>
+              <a:rPr lang="en-US" dirty="0"/>
+              <a:t>Find options:</a:t>
+            </a:r>
+          </a:p>
+          <a:p>
+            <a:pPr lvl="2"/>
+            <a:r>
+              <a:rPr lang="en-US" dirty="0"/>
+              <a:t>where</a:t>
+            </a:r>
+          </a:p>
+          <a:p>
+            <a:pPr lvl="3"/>
+            <a:r>
+              <a:rPr lang="en-US" dirty="0"/>
+              <a:t>and</a:t>
+            </a:r>
+          </a:p>
+          <a:p>
+            <a:pPr lvl="3"/>
+            <a:r>
+              <a:rPr lang="en-US" dirty="0"/>
+              <a:t>or</a:t>
+            </a:r>
+          </a:p>
+          <a:p>
+            <a:pPr lvl="2"/>
+            <a:r>
+              <a:rPr lang="en-US" dirty="0"/>
+              <a:t>order</a:t>
+            </a:r>
+          </a:p>
+          <a:p>
+            <a:pPr lvl="2"/>
+            <a:r>
+              <a:rPr lang="en-US" dirty="0"/>
+              <a:t>skip, limit</a:t>
+            </a:r>
+          </a:p>
+          <a:p>
+            <a:pPr lvl="2"/>
+            <a:r>
+              <a:rPr lang="en-US" dirty="0"/>
+              <a:t>Not, </a:t>
+            </a:r>
+            <a:r>
+              <a:rPr lang="en-US" dirty="0" err="1"/>
+              <a:t>lessThan</a:t>
+            </a:r>
+            <a:r>
+              <a:rPr lang="en-US" dirty="0"/>
+              <a:t>, </a:t>
+            </a:r>
+            <a:r>
+              <a:rPr lang="en-US" dirty="0" err="1"/>
+              <a:t>moreThan</a:t>
+            </a:r>
+            <a:r>
+              <a:rPr lang="en-US" dirty="0"/>
+              <a:t>, equal, Like, between, In, Raw</a:t>
+            </a:r>
+          </a:p>
+        </p:txBody>
+      </p:sp>
+      <p:sp>
+        <p:nvSpPr>
+          <p:cNvPr id="4" name="Footer Placeholder 3">
+            <a:extLst>
+              <a:ext uri="{FF2B5EF4-FFF2-40B4-BE49-F238E27FC236}">
+                <a16:creationId xmlns:a16="http://schemas.microsoft.com/office/drawing/2014/main" id="{7487B8C4-4B8B-405F-B260-BC8BA3FB938F}"/>
+              </a:ext>
+            </a:extLst>
+          </p:cNvPr>
+          <p:cNvSpPr>
+            <a:spLocks noGrp="1"/>
+          </p:cNvSpPr>
+          <p:nvPr>
+            <p:ph type="ftr" sz="quarter" idx="11"/>
+          </p:nvPr>
+        </p:nvSpPr>
+        <p:spPr/>
+        <p:txBody>
+          <a:bodyPr/>
+          <a:lstStyle/>
+          <a:p>
+            <a:r>
+              <a:rPr lang="en-US"/>
+              <a:t>ORM</a:t>
+            </a:r>
+            <a:endParaRPr lang="en-US" dirty="0"/>
+          </a:p>
+        </p:txBody>
+      </p:sp>
+      <p:sp>
+        <p:nvSpPr>
+          <p:cNvPr id="5" name="Slide Number Placeholder 4">
+            <a:extLst>
+              <a:ext uri="{FF2B5EF4-FFF2-40B4-BE49-F238E27FC236}">
+                <a16:creationId xmlns:a16="http://schemas.microsoft.com/office/drawing/2014/main" id="{8717A94B-045F-449C-A2FD-59602F4F64AB}"/>
+              </a:ext>
+            </a:extLst>
+          </p:cNvPr>
+          <p:cNvSpPr>
+            <a:spLocks noGrp="1"/>
+          </p:cNvSpPr>
+          <p:nvPr>
+            <p:ph type="sldNum" sz="quarter" idx="12"/>
+          </p:nvPr>
+        </p:nvSpPr>
+        <p:spPr/>
+        <p:txBody>
+          <a:bodyPr/>
+          <a:lstStyle/>
+          <a:p>
+            <a:fld id="{3A98EE3D-8CD1-4C3F-BD1C-C98C9596463C}" type="slidenum">
+              <a:rPr lang="en-US" smtClean="0"/>
+              <a:t>5</a:t>
+            </a:fld>
+            <a:endParaRPr lang="en-US" dirty="0"/>
+          </a:p>
+        </p:txBody>
+      </p:sp>
+    </p:spTree>
+    <p:extLst>
+      <p:ext uri="{BB962C8B-B14F-4D97-AF65-F5344CB8AC3E}">
+        <p14:creationId xmlns:p14="http://schemas.microsoft.com/office/powerpoint/2010/main" val="1378292981"/>
+      </p:ext>
+    </p:extLst>
+  </p:cSld>
+  <p:clrMapOvr>
+    <a:masterClrMapping/>
+  </p:clrMapOvr>
+</p:sld>
+</file>
+
+<file path=ppt/slides/slide6.xml><?xml version="1.0" encoding="utf-8"?>
+<p:sld xmlns:a="http://schemas.openxmlformats.org/drawingml/2006/main" xmlns:r="http://schemas.openxmlformats.org/officeDocument/2006/relationships" xmlns:p="http://schemas.openxmlformats.org/presentationml/2006/main">
+  <p:cSld>
+    <p:spTree>
+      <p:nvGrpSpPr>
+        <p:cNvPr id="1" name=""/>
+        <p:cNvGrpSpPr/>
+        <p:nvPr/>
+      </p:nvGrpSpPr>
+      <p:grpSpPr>
+        <a:xfrm>
+          <a:off x="0" y="0"/>
+          <a:ext cx="0" cy="0"/>
+          <a:chOff x="0" y="0"/>
+          <a:chExt cx="0" cy="0"/>
+        </a:xfrm>
+      </p:grpSpPr>
+      <p:sp>
+        <p:nvSpPr>
+          <p:cNvPr id="2" name="Title 1">
+            <a:extLst>
+              <a:ext uri="{FF2B5EF4-FFF2-40B4-BE49-F238E27FC236}">
+                <a16:creationId xmlns:a16="http://schemas.microsoft.com/office/drawing/2014/main" id="{70D63839-212C-4A12-A7DA-3DA02ACD7C26}"/>
+              </a:ext>
+            </a:extLst>
+          </p:cNvPr>
+          <p:cNvSpPr>
+            <a:spLocks noGrp="1"/>
+          </p:cNvSpPr>
+          <p:nvPr>
+            <p:ph type="title"/>
+          </p:nvPr>
+        </p:nvSpPr>
+        <p:spPr/>
+        <p:txBody>
+          <a:bodyPr/>
+          <a:lstStyle/>
+          <a:p>
+            <a:r>
+              <a:rPr lang="en-US" dirty="0"/>
+              <a:t>Demo</a:t>
+            </a:r>
+            <a:endParaRPr lang="fa-IR" dirty="0"/>
+          </a:p>
+        </p:txBody>
+      </p:sp>
+      <p:sp>
+        <p:nvSpPr>
+          <p:cNvPr id="3" name="Content Placeholder 2">
+            <a:extLst>
+              <a:ext uri="{FF2B5EF4-FFF2-40B4-BE49-F238E27FC236}">
+                <a16:creationId xmlns:a16="http://schemas.microsoft.com/office/drawing/2014/main" id="{8DCCF2A0-DD32-4F7C-91C1-F9F64E19D564}"/>
+              </a:ext>
+            </a:extLst>
+          </p:cNvPr>
+          <p:cNvSpPr>
+            <a:spLocks noGrp="1"/>
+          </p:cNvSpPr>
+          <p:nvPr>
+            <p:ph idx="1"/>
+          </p:nvPr>
+        </p:nvSpPr>
+        <p:spPr/>
+        <p:txBody>
+          <a:bodyPr/>
+          <a:lstStyle/>
+          <a:p>
+            <a:r>
+              <a:rPr lang="en-US" dirty="0"/>
+              <a:t>Fetch</a:t>
+            </a:r>
+          </a:p>
+          <a:p>
+            <a:pPr lvl="1"/>
+            <a:r>
+              <a:rPr lang="en-US" dirty="0" err="1"/>
+              <a:t>queryBuilder</a:t>
+            </a:r>
+            <a:endParaRPr lang="en-US" dirty="0"/>
+          </a:p>
+          <a:p>
+            <a:pPr marL="1024128" indent="-219456" algn="l" rtl="0" eaLnBrk="1" latinLnBrk="0" hangingPunct="1">
+              <a:spcBef>
+                <a:spcPts val="432"/>
+              </a:spcBef>
+              <a:spcAft>
+                <a:spcPts val="600"/>
+              </a:spcAft>
+            </a:pPr>
+            <a:r>
+              <a:rPr lang="en-US" sz="1800" kern="1200" dirty="0">
+                <a:ln w="9525" cap="flat" cmpd="sng" algn="ctr">
+                  <a:solidFill>
+                    <a:srgbClr val="404040">
+                      <a:alpha val="10000"/>
+                    </a:srgbClr>
+                  </a:solidFill>
+                  <a:prstDash val="solid"/>
+                  <a:round/>
+                </a:ln>
+                <a:solidFill>
+                  <a:srgbClr val="F4EEDC"/>
+                </a:solidFill>
+                <a:effectLst>
+                  <a:outerShdw blurRad="9525" dist="25400" dir="14640000" algn="tl" rotWithShape="0">
+                    <a:schemeClr val="bg1">
+                      <a:alpha val="30000"/>
+                    </a:schemeClr>
+                  </a:outerShdw>
+                </a:effectLst>
+                <a:latin typeface="Segoe UI Black" panose="020B0A02040204020203" pitchFamily="34" charset="0"/>
+                <a:ea typeface="Segoe UI Black" panose="020B0A02040204020203" pitchFamily="34" charset="0"/>
+                <a:cs typeface="+mn-cs"/>
+              </a:rPr>
+              <a:t>select</a:t>
+            </a:r>
+            <a:endParaRPr lang="fa-IR" dirty="0">
+              <a:effectLst/>
+            </a:endParaRPr>
+          </a:p>
+          <a:p>
+            <a:pPr marL="1024128" indent="-219456" algn="l" rtl="0" eaLnBrk="1" latinLnBrk="0" hangingPunct="1">
+              <a:spcBef>
+                <a:spcPts val="432"/>
+              </a:spcBef>
+              <a:spcAft>
+                <a:spcPts val="600"/>
+              </a:spcAft>
+            </a:pPr>
+            <a:r>
+              <a:rPr lang="en-US" sz="1800" kern="1200" dirty="0">
+                <a:ln w="9525" cap="flat" cmpd="sng" algn="ctr">
+                  <a:solidFill>
+                    <a:srgbClr val="404040">
+                      <a:alpha val="10000"/>
+                    </a:srgbClr>
+                  </a:solidFill>
+                  <a:prstDash val="solid"/>
+                  <a:round/>
+                </a:ln>
+                <a:solidFill>
+                  <a:srgbClr val="F4EEDC"/>
+                </a:solidFill>
+                <a:effectLst>
+                  <a:outerShdw blurRad="9525" dist="25400" dir="14640000" algn="tl" rotWithShape="0">
+                    <a:schemeClr val="bg1">
+                      <a:alpha val="30000"/>
+                    </a:schemeClr>
+                  </a:outerShdw>
+                </a:effectLst>
+                <a:latin typeface="Segoe UI Black" panose="020B0A02040204020203" pitchFamily="34" charset="0"/>
+                <a:ea typeface="Segoe UI Black" panose="020B0A02040204020203" pitchFamily="34" charset="0"/>
+                <a:cs typeface="+mn-cs"/>
+              </a:rPr>
+              <a:t>where</a:t>
+            </a:r>
+            <a:endParaRPr lang="fa-IR" dirty="0">
+              <a:effectLst/>
+            </a:endParaRPr>
+          </a:p>
+          <a:p>
+            <a:pPr marL="1024128" indent="-219456" algn="l" rtl="0" eaLnBrk="1" latinLnBrk="0" hangingPunct="1">
+              <a:spcBef>
+                <a:spcPts val="432"/>
+              </a:spcBef>
+              <a:spcAft>
+                <a:spcPts val="600"/>
+              </a:spcAft>
+            </a:pPr>
+            <a:r>
+              <a:rPr lang="en-US" sz="1800" kern="1200" dirty="0">
+                <a:ln w="9525" cap="flat" cmpd="sng" algn="ctr">
+                  <a:solidFill>
+                    <a:srgbClr val="404040">
+                      <a:alpha val="10000"/>
+                    </a:srgbClr>
+                  </a:solidFill>
+                  <a:prstDash val="solid"/>
+                  <a:round/>
+                </a:ln>
+                <a:solidFill>
+                  <a:srgbClr val="F4EEDC"/>
+                </a:solidFill>
+                <a:effectLst>
+                  <a:outerShdw blurRad="9525" dist="25400" dir="14640000" algn="tl" rotWithShape="0">
+                    <a:schemeClr val="bg1">
+                      <a:alpha val="30000"/>
+                    </a:schemeClr>
+                  </a:outerShdw>
+                </a:effectLst>
+                <a:latin typeface="Segoe UI Black" panose="020B0A02040204020203" pitchFamily="34" charset="0"/>
+                <a:ea typeface="Segoe UI Black" panose="020B0A02040204020203" pitchFamily="34" charset="0"/>
+                <a:cs typeface="+mn-cs"/>
+              </a:rPr>
+              <a:t>join</a:t>
+            </a:r>
+            <a:endParaRPr lang="fa-IR" dirty="0">
+              <a:effectLst/>
+            </a:endParaRPr>
+          </a:p>
+          <a:p>
+            <a:pPr marL="1024128" indent="-219456" algn="l" rtl="0" eaLnBrk="1" latinLnBrk="0" hangingPunct="1">
+              <a:spcBef>
+                <a:spcPts val="432"/>
+              </a:spcBef>
+              <a:spcAft>
+                <a:spcPts val="600"/>
+              </a:spcAft>
+            </a:pPr>
+            <a:r>
+              <a:rPr lang="en-US" sz="1800" kern="1200" dirty="0" err="1">
+                <a:ln w="9525" cap="flat" cmpd="sng" algn="ctr">
+                  <a:solidFill>
+                    <a:srgbClr val="404040">
+                      <a:alpha val="10000"/>
+                    </a:srgbClr>
+                  </a:solidFill>
+                  <a:prstDash val="solid"/>
+                  <a:round/>
+                </a:ln>
+                <a:solidFill>
+                  <a:srgbClr val="F4EEDC"/>
+                </a:solidFill>
+                <a:effectLst>
+                  <a:outerShdw blurRad="9525" dist="25400" dir="14640000" algn="tl" rotWithShape="0">
+                    <a:schemeClr val="bg1">
+                      <a:alpha val="30000"/>
+                    </a:schemeClr>
+                  </a:outerShdw>
+                </a:effectLst>
+                <a:latin typeface="Segoe UI Black" panose="020B0A02040204020203" pitchFamily="34" charset="0"/>
+                <a:ea typeface="Segoe UI Black" panose="020B0A02040204020203" pitchFamily="34" charset="0"/>
+                <a:cs typeface="+mn-cs"/>
+              </a:rPr>
+              <a:t>getOne</a:t>
+            </a:r>
+            <a:endParaRPr lang="fa-IR" dirty="0">
+              <a:effectLst/>
+            </a:endParaRPr>
+          </a:p>
+        </p:txBody>
+      </p:sp>
+      <p:sp>
+        <p:nvSpPr>
+          <p:cNvPr id="4" name="Footer Placeholder 3">
+            <a:extLst>
+              <a:ext uri="{FF2B5EF4-FFF2-40B4-BE49-F238E27FC236}">
+                <a16:creationId xmlns:a16="http://schemas.microsoft.com/office/drawing/2014/main" id="{38BA3D22-FEAC-42B4-8212-2333887E887A}"/>
+              </a:ext>
+            </a:extLst>
+          </p:cNvPr>
+          <p:cNvSpPr>
+            <a:spLocks noGrp="1"/>
+          </p:cNvSpPr>
+          <p:nvPr>
+            <p:ph type="ftr" sz="quarter" idx="11"/>
+          </p:nvPr>
+        </p:nvSpPr>
+        <p:spPr/>
+        <p:txBody>
+          <a:bodyPr/>
+          <a:lstStyle/>
+          <a:p>
+            <a:r>
+              <a:rPr lang="en-US"/>
+              <a:t>ORM</a:t>
+            </a:r>
+            <a:endParaRPr lang="en-US" dirty="0"/>
+          </a:p>
+        </p:txBody>
+      </p:sp>
+      <p:sp>
+        <p:nvSpPr>
+          <p:cNvPr id="5" name="Slide Number Placeholder 4">
+            <a:extLst>
+              <a:ext uri="{FF2B5EF4-FFF2-40B4-BE49-F238E27FC236}">
+                <a16:creationId xmlns:a16="http://schemas.microsoft.com/office/drawing/2014/main" id="{796E8034-8C65-443F-B7F1-8EA2EF90698F}"/>
+              </a:ext>
+            </a:extLst>
+          </p:cNvPr>
+          <p:cNvSpPr>
+            <a:spLocks noGrp="1"/>
+          </p:cNvSpPr>
+          <p:nvPr>
+            <p:ph type="sldNum" sz="quarter" idx="12"/>
+          </p:nvPr>
+        </p:nvSpPr>
+        <p:spPr/>
+        <p:txBody>
+          <a:bodyPr/>
+          <a:lstStyle/>
+          <a:p>
+            <a:fld id="{3A98EE3D-8CD1-4C3F-BD1C-C98C9596463C}" type="slidenum">
+              <a:rPr lang="en-US" smtClean="0"/>
+              <a:t>6</a:t>
+            </a:fld>
+            <a:endParaRPr lang="en-US" dirty="0"/>
+          </a:p>
+        </p:txBody>
+      </p:sp>
+    </p:spTree>
+    <p:extLst>
+      <p:ext uri="{BB962C8B-B14F-4D97-AF65-F5344CB8AC3E}">
+        <p14:creationId xmlns:p14="http://schemas.microsoft.com/office/powerpoint/2010/main" val="2007021943"/>
+      </p:ext>
+    </p:extLst>
+  </p:cSld>
+  <p:clrMapOvr>
+    <a:masterClrMapping/>
+  </p:clrMapOvr>
+</p:sld>
+</file>
+
+<file path=ppt/slides/slide7.xml><?xml version="1.0" encoding="utf-8"?>
+<p:sld xmlns:a="http://schemas.openxmlformats.org/drawingml/2006/main" xmlns:r="http://schemas.openxmlformats.org/officeDocument/2006/relationships" xmlns:p="http://schemas.openxmlformats.org/presentationml/2006/main">
+  <p:cSld>
+    <p:spTree>
+      <p:nvGrpSpPr>
+        <p:cNvPr id="1" name=""/>
+        <p:cNvGrpSpPr/>
+        <p:nvPr/>
+      </p:nvGrpSpPr>
+      <p:grpSpPr>
+        <a:xfrm>
+          <a:off x="0" y="0"/>
+          <a:ext cx="0" cy="0"/>
+          <a:chOff x="0" y="0"/>
+          <a:chExt cx="0" cy="0"/>
+        </a:xfrm>
+      </p:grpSpPr>
+      <p:sp>
+        <p:nvSpPr>
+          <p:cNvPr id="2" name="Title 1">
+            <a:extLst>
+              <a:ext uri="{FF2B5EF4-FFF2-40B4-BE49-F238E27FC236}">
+                <a16:creationId xmlns:a16="http://schemas.microsoft.com/office/drawing/2014/main" id="{0E37C3E6-DA96-4EFE-92EA-12E87A43E0DB}"/>
+              </a:ext>
+            </a:extLst>
+          </p:cNvPr>
+          <p:cNvSpPr>
+            <a:spLocks noGrp="1"/>
+          </p:cNvSpPr>
+          <p:nvPr>
+            <p:ph type="title"/>
+          </p:nvPr>
+        </p:nvSpPr>
+        <p:spPr/>
+        <p:txBody>
+          <a:bodyPr/>
+          <a:lstStyle/>
+          <a:p>
+            <a:r>
+              <a:rPr lang="en-US" dirty="0"/>
+              <a:t>Exercise</a:t>
+            </a:r>
+            <a:endParaRPr lang="fa-IR" dirty="0"/>
+          </a:p>
+        </p:txBody>
+      </p:sp>
+      <p:sp>
+        <p:nvSpPr>
+          <p:cNvPr id="3" name="Content Placeholder 2">
+            <a:extLst>
+              <a:ext uri="{FF2B5EF4-FFF2-40B4-BE49-F238E27FC236}">
+                <a16:creationId xmlns:a16="http://schemas.microsoft.com/office/drawing/2014/main" id="{9ED03BBB-DF26-4E7C-AE9E-1878803DAB95}"/>
+              </a:ext>
+            </a:extLst>
+          </p:cNvPr>
+          <p:cNvSpPr>
+            <a:spLocks noGrp="1"/>
+          </p:cNvSpPr>
+          <p:nvPr>
+            <p:ph idx="1"/>
+          </p:nvPr>
+        </p:nvSpPr>
+        <p:spPr/>
+        <p:txBody>
+          <a:bodyPr/>
+          <a:lstStyle/>
+          <a:p>
+            <a:r>
+              <a:rPr lang="en-US" dirty="0"/>
+              <a:t>Complete your project with databases.</a:t>
+            </a:r>
+          </a:p>
+        </p:txBody>
+      </p:sp>
+      <p:sp>
+        <p:nvSpPr>
+          <p:cNvPr id="4" name="Footer Placeholder 3">
+            <a:extLst>
+              <a:ext uri="{FF2B5EF4-FFF2-40B4-BE49-F238E27FC236}">
+                <a16:creationId xmlns:a16="http://schemas.microsoft.com/office/drawing/2014/main" id="{7AF54956-47B6-4954-B150-D60FE03EA9FC}"/>
+              </a:ext>
+            </a:extLst>
+          </p:cNvPr>
+          <p:cNvSpPr>
+            <a:spLocks noGrp="1"/>
+          </p:cNvSpPr>
+          <p:nvPr>
+            <p:ph type="ftr" sz="quarter" idx="11"/>
+          </p:nvPr>
+        </p:nvSpPr>
+        <p:spPr/>
+        <p:txBody>
+          <a:bodyPr/>
+          <a:lstStyle/>
+          <a:p>
+            <a:r>
+              <a:rPr lang="en-US"/>
+              <a:t>ORM</a:t>
+            </a:r>
+            <a:endParaRPr lang="en-US" dirty="0"/>
+          </a:p>
+        </p:txBody>
+      </p:sp>
+      <p:sp>
+        <p:nvSpPr>
+          <p:cNvPr id="5" name="Slide Number Placeholder 4">
+            <a:extLst>
+              <a:ext uri="{FF2B5EF4-FFF2-40B4-BE49-F238E27FC236}">
+                <a16:creationId xmlns:a16="http://schemas.microsoft.com/office/drawing/2014/main" id="{1A59E710-16F0-4D85-83A5-9166AF60F49A}"/>
+              </a:ext>
+            </a:extLst>
+          </p:cNvPr>
+          <p:cNvSpPr>
+            <a:spLocks noGrp="1"/>
+          </p:cNvSpPr>
+          <p:nvPr>
+            <p:ph type="sldNum" sz="quarter" idx="12"/>
+          </p:nvPr>
+        </p:nvSpPr>
+        <p:spPr/>
+        <p:txBody>
+          <a:bodyPr/>
+          <a:lstStyle/>
+          <a:p>
+            <a:fld id="{3A98EE3D-8CD1-4C3F-BD1C-C98C9596463C}" type="slidenum">
+              <a:rPr lang="en-US" smtClean="0"/>
+              <a:t>7</a:t>
+            </a:fld>
+            <a:endParaRPr lang="en-US" dirty="0"/>
+          </a:p>
+        </p:txBody>
+      </p:sp>
+    </p:spTree>
+    <p:extLst>
+      <p:ext uri="{BB962C8B-B14F-4D97-AF65-F5344CB8AC3E}">
+        <p14:creationId xmlns:p14="http://schemas.microsoft.com/office/powerpoint/2010/main" val="43779603"/>
       </p:ext>
     </p:extLst>
   </p:cSld>

</xml_diff>

<commit_message>
feat: add orm 03
</commit_message>
<xml_diff>
--- a/orm/orm-03.pptx
+++ b/orm/orm-03.pptx
@@ -5,7 +5,7 @@
     <p:sldMasterId id="2147483705" r:id="rId1"/>
   </p:sldMasterIdLst>
   <p:notesMasterIdLst>
-    <p:notesMasterId r:id="rId9"/>
+    <p:notesMasterId r:id="rId8"/>
   </p:notesMasterIdLst>
   <p:sldIdLst>
     <p:sldId id="259" r:id="rId2"/>
@@ -13,8 +13,7 @@
     <p:sldId id="296" r:id="rId4"/>
     <p:sldId id="297" r:id="rId5"/>
     <p:sldId id="299" r:id="rId6"/>
-    <p:sldId id="300" r:id="rId7"/>
-    <p:sldId id="298" r:id="rId8"/>
+    <p:sldId id="298" r:id="rId7"/>
   </p:sldIdLst>
   <p:sldSz cx="12192000" cy="6858000"/>
   <p:notesSz cx="6858000" cy="9144000"/>
@@ -203,7 +202,7 @@
           <a:p>
             <a:fld id="{9B9ECB28-6A22-4037-9487-F3F739F744D6}" type="datetimeFigureOut">
               <a:rPr lang="en-US" smtClean="0"/>
-              <a:t>12/26/2021</a:t>
+              <a:t>12/27/2021</a:t>
             </a:fld>
             <a:endParaRPr lang="en-US"/>
           </a:p>
@@ -558,94 +557,6 @@
 </p:notes>
 </file>
 
-<file path=ppt/notesSlides/notesSlide2.xml><?xml version="1.0" encoding="utf-8"?>
-<p:notes xmlns:a="http://schemas.openxmlformats.org/drawingml/2006/main" xmlns:r="http://schemas.openxmlformats.org/officeDocument/2006/relationships" xmlns:p="http://schemas.openxmlformats.org/presentationml/2006/main">
-  <p:cSld>
-    <p:spTree>
-      <p:nvGrpSpPr>
-        <p:cNvPr id="1" name=""/>
-        <p:cNvGrpSpPr/>
-        <p:nvPr/>
-      </p:nvGrpSpPr>
-      <p:grpSpPr>
-        <a:xfrm>
-          <a:off x="0" y="0"/>
-          <a:ext cx="0" cy="0"/>
-          <a:chOff x="0" y="0"/>
-          <a:chExt cx="0" cy="0"/>
-        </a:xfrm>
-      </p:grpSpPr>
-      <p:sp>
-        <p:nvSpPr>
-          <p:cNvPr id="2" name="Slide Image Placeholder 1"/>
-          <p:cNvSpPr>
-            <a:spLocks noGrp="1" noRot="1" noChangeAspect="1"/>
-          </p:cNvSpPr>
-          <p:nvPr>
-            <p:ph type="sldImg"/>
-          </p:nvPr>
-        </p:nvSpPr>
-        <p:spPr/>
-      </p:sp>
-      <p:sp>
-        <p:nvSpPr>
-          <p:cNvPr id="3" name="Notes Placeholder 2"/>
-          <p:cNvSpPr>
-            <a:spLocks noGrp="1"/>
-          </p:cNvSpPr>
-          <p:nvPr>
-            <p:ph type="body" idx="1"/>
-          </p:nvPr>
-        </p:nvSpPr>
-        <p:spPr/>
-        <p:txBody>
-          <a:bodyPr/>
-          <a:lstStyle/>
-          <a:p>
-            <a:r>
-              <a:rPr lang="en-US" dirty="0"/>
-              <a:t>https://orkhan.gitbook.io/typeorm/docs/select-query-builder</a:t>
-            </a:r>
-            <a:endParaRPr lang="fa-IR" dirty="0"/>
-          </a:p>
-        </p:txBody>
-      </p:sp>
-      <p:sp>
-        <p:nvSpPr>
-          <p:cNvPr id="4" name="Slide Number Placeholder 3"/>
-          <p:cNvSpPr>
-            <a:spLocks noGrp="1"/>
-          </p:cNvSpPr>
-          <p:nvPr>
-            <p:ph type="sldNum" sz="quarter" idx="5"/>
-          </p:nvPr>
-        </p:nvSpPr>
-        <p:spPr/>
-        <p:txBody>
-          <a:bodyPr/>
-          <a:lstStyle/>
-          <a:p>
-            <a:fld id="{0FE84E6F-3671-472C-BE6F-A37BC298F4AB}" type="slidenum">
-              <a:rPr lang="en-US" smtClean="0"/>
-              <a:t>6</a:t>
-            </a:fld>
-            <a:endParaRPr lang="en-US"/>
-          </a:p>
-        </p:txBody>
-      </p:sp>
-    </p:spTree>
-    <p:extLst>
-      <p:ext uri="{BB962C8B-B14F-4D97-AF65-F5344CB8AC3E}">
-        <p14:creationId xmlns:p14="http://schemas.microsoft.com/office/powerpoint/2010/main" val="3009885762"/>
-      </p:ext>
-    </p:extLst>
-  </p:cSld>
-  <p:clrMapOvr>
-    <a:masterClrMapping/>
-  </p:clrMapOvr>
-</p:notes>
-</file>
-
 <file path=ppt/slideLayouts/slideLayout1.xml><?xml version="1.0" encoding="utf-8"?>
 <p:sldLayout xmlns:a="http://schemas.openxmlformats.org/drawingml/2006/main" xmlns:r="http://schemas.openxmlformats.org/officeDocument/2006/relationships" xmlns:p="http://schemas.openxmlformats.org/presentationml/2006/main" type="title" preserve="1">
   <p:cSld name="Title Slide">
@@ -830,7 +741,7 @@
           <a:p>
             <a:fld id="{04292BB3-D7FE-4490-A369-7BA9FA0F2D7D}" type="datetime1">
               <a:rPr lang="en-US" smtClean="0"/>
-              <a:t>12/26/2021</a:t>
+              <a:t>12/27/2021</a:t>
             </a:fld>
             <a:endParaRPr lang="en-US" dirty="0"/>
           </a:p>
@@ -1139,7 +1050,7 @@
           <a:p>
             <a:fld id="{71430156-F29C-46EC-A871-806AE8294476}" type="datetime1">
               <a:rPr lang="en-US" smtClean="0"/>
-              <a:t>12/26/2021</a:t>
+              <a:t>12/27/2021</a:t>
             </a:fld>
             <a:endParaRPr lang="en-US" dirty="0"/>
           </a:p>
@@ -1337,7 +1248,7 @@
           <a:p>
             <a:fld id="{452C1D77-010B-4F6F-9888-C3320C9E1C83}" type="datetime1">
               <a:rPr lang="en-US" smtClean="0"/>
-              <a:t>12/26/2021</a:t>
+              <a:t>12/27/2021</a:t>
             </a:fld>
             <a:endParaRPr lang="en-US" dirty="0"/>
           </a:p>
@@ -1604,7 +1515,7 @@
           <a:p>
             <a:fld id="{5FE0F86D-F97D-48BB-BD0F-99F6CE010ADF}" type="datetime1">
               <a:rPr lang="en-US" smtClean="0"/>
-              <a:t>12/26/2021</a:t>
+              <a:t>12/27/2021</a:t>
             </a:fld>
             <a:endParaRPr lang="en-US" dirty="0"/>
           </a:p>
@@ -2044,7 +1955,7 @@
           <a:p>
             <a:fld id="{223B543A-94C7-4785-BA8F-D2DF664B813B}" type="datetime1">
               <a:rPr lang="en-US" smtClean="0"/>
-              <a:t>12/26/2021</a:t>
+              <a:t>12/27/2021</a:t>
             </a:fld>
             <a:endParaRPr lang="en-US" dirty="0"/>
           </a:p>
@@ -2585,7 +2496,7 @@
           <a:p>
             <a:fld id="{C6188102-512C-443F-80D2-B8F38A68E8E0}" type="datetime1">
               <a:rPr lang="en-US" smtClean="0"/>
-              <a:t>12/26/2021</a:t>
+              <a:t>12/27/2021</a:t>
             </a:fld>
             <a:endParaRPr lang="en-US" dirty="0"/>
           </a:p>
@@ -3471,7 +3382,7 @@
           <a:p>
             <a:fld id="{D6E94816-01EF-4877-B644-9B335C39E9B1}" type="datetime1">
               <a:rPr lang="en-US" smtClean="0"/>
-              <a:t>12/26/2021</a:t>
+              <a:t>12/27/2021</a:t>
             </a:fld>
             <a:endParaRPr lang="en-US" dirty="0"/>
           </a:p>
@@ -3645,7 +3556,7 @@
           <a:p>
             <a:fld id="{2F4AFB9C-1CA0-4C59-AF85-2C64F7A24A2B}" type="datetime1">
               <a:rPr lang="en-US" smtClean="0"/>
-              <a:t>12/26/2021</a:t>
+              <a:t>12/27/2021</a:t>
             </a:fld>
             <a:endParaRPr lang="en-US" dirty="0"/>
           </a:p>
@@ -3833,7 +3744,7 @@
           <a:p>
             <a:fld id="{C2849F83-4F55-4CEC-BF3D-4AB5FE85918E}" type="datetime1">
               <a:rPr lang="en-US" smtClean="0"/>
-              <a:t>12/26/2021</a:t>
+              <a:t>12/27/2021</a:t>
             </a:fld>
             <a:endParaRPr lang="en-US" dirty="0"/>
           </a:p>
@@ -4007,7 +3918,7 @@
           <a:p>
             <a:fld id="{7CE8E275-0A33-4735-B717-275101F6E22C}" type="datetime1">
               <a:rPr lang="en-US" smtClean="0"/>
-              <a:t>12/26/2021</a:t>
+              <a:t>12/27/2021</a:t>
             </a:fld>
             <a:endParaRPr lang="en-US" dirty="0"/>
           </a:p>
@@ -4255,7 +4166,7 @@
           <a:p>
             <a:fld id="{11DE1D34-5930-414B-861A-C08DBE059BCD}" type="datetime1">
               <a:rPr lang="en-US" smtClean="0"/>
-              <a:t>12/26/2021</a:t>
+              <a:t>12/27/2021</a:t>
             </a:fld>
             <a:endParaRPr lang="en-US" dirty="0"/>
           </a:p>
@@ -4501,7 +4412,7 @@
           <a:p>
             <a:fld id="{1F0B5F0E-C69B-493D-BC11-8AC8D8992B44}" type="datetime1">
               <a:rPr lang="en-US" smtClean="0"/>
-              <a:t>12/26/2021</a:t>
+              <a:t>12/27/2021</a:t>
             </a:fld>
             <a:endParaRPr lang="en-US" dirty="0"/>
           </a:p>
@@ -4988,7 +4899,7 @@
           <a:p>
             <a:fld id="{B5172908-172A-4EC8-B0B5-05FD12C13D2A}" type="datetime1">
               <a:rPr lang="en-US" smtClean="0"/>
-              <a:t>12/26/2021</a:t>
+              <a:t>12/27/2021</a:t>
             </a:fld>
             <a:endParaRPr lang="en-US" dirty="0"/>
           </a:p>
@@ -5110,7 +5021,7 @@
           <a:p>
             <a:fld id="{1C7364DF-3607-4A5A-AB83-404A3BB8D335}" type="datetime1">
               <a:rPr lang="en-US" smtClean="0"/>
-              <a:t>12/26/2021</a:t>
+              <a:t>12/27/2021</a:t>
             </a:fld>
             <a:endParaRPr lang="en-US" dirty="0"/>
           </a:p>
@@ -5209,7 +5120,7 @@
           <a:p>
             <a:fld id="{AC157155-FDF4-4485-AFEF-D9170575ED26}" type="datetime1">
               <a:rPr lang="en-US" smtClean="0"/>
-              <a:t>12/26/2021</a:t>
+              <a:t>12/27/2021</a:t>
             </a:fld>
             <a:endParaRPr lang="en-US" dirty="0"/>
           </a:p>
@@ -5468,7 +5379,7 @@
           <a:p>
             <a:fld id="{4E0CDAD6-4FF7-4455-A473-3E54CC5E4B8D}" type="datetime1">
               <a:rPr lang="en-US" smtClean="0"/>
-              <a:t>12/26/2021</a:t>
+              <a:t>12/27/2021</a:t>
             </a:fld>
             <a:endParaRPr lang="en-US" dirty="0"/>
           </a:p>
@@ -5779,7 +5690,7 @@
           <a:p>
             <a:fld id="{14F360E8-6D9C-4BF1-AB66-4049DE6B2F72}" type="datetime1">
               <a:rPr lang="en-US" smtClean="0"/>
-              <a:t>12/26/2021</a:t>
+              <a:t>12/27/2021</a:t>
             </a:fld>
             <a:endParaRPr lang="en-US" dirty="0"/>
           </a:p>
@@ -6016,7 +5927,7 @@
           <a:p>
             <a:fld id="{67EFE8E3-5D3D-4D11-AF9A-841EFA9359C2}" type="datetime1">
               <a:rPr lang="en-US" smtClean="0"/>
-              <a:t>12/26/2021</a:t>
+              <a:t>12/27/2021</a:t>
             </a:fld>
             <a:endParaRPr lang="en-US" dirty="0"/>
           </a:p>
@@ -7359,21 +7270,27 @@
           <a:p>
             <a:pPr lvl="2"/>
             <a:r>
-              <a:rPr lang="en-US" dirty="0"/>
+              <a:rPr lang="en-US" dirty="0">
+                <a:latin typeface="Consolas" panose="020B0609020204030204" pitchFamily="49" charset="0"/>
+              </a:rPr>
               <a:t>select</a:t>
             </a:r>
           </a:p>
           <a:p>
             <a:pPr lvl="2"/>
             <a:r>
-              <a:rPr lang="en-US" dirty="0"/>
+              <a:rPr lang="en-US" dirty="0">
+                <a:latin typeface="Consolas" panose="020B0609020204030204" pitchFamily="49" charset="0"/>
+              </a:rPr>
               <a:t>relations</a:t>
             </a:r>
           </a:p>
           <a:p>
             <a:pPr lvl="2"/>
             <a:r>
-              <a:rPr lang="en-US" dirty="0"/>
+              <a:rPr lang="en-US" dirty="0">
+                <a:latin typeface="Consolas" panose="020B0609020204030204" pitchFamily="49" charset="0"/>
+              </a:rPr>
               <a:t>join</a:t>
             </a:r>
           </a:p>
@@ -7536,59 +7453,79 @@
           <a:p>
             <a:pPr lvl="2"/>
             <a:r>
-              <a:rPr lang="en-US" dirty="0"/>
+              <a:rPr lang="en-US" dirty="0">
+                <a:latin typeface="Consolas" panose="020B0609020204030204" pitchFamily="49" charset="0"/>
+              </a:rPr>
               <a:t>where</a:t>
             </a:r>
           </a:p>
           <a:p>
             <a:pPr lvl="3"/>
             <a:r>
-              <a:rPr lang="en-US" dirty="0"/>
+              <a:rPr lang="en-US" sz="1800" dirty="0">
+                <a:latin typeface="Consolas" panose="020B0609020204030204" pitchFamily="49" charset="0"/>
+              </a:rPr>
               <a:t>and</a:t>
             </a:r>
           </a:p>
           <a:p>
             <a:pPr lvl="3"/>
             <a:r>
-              <a:rPr lang="en-US" dirty="0"/>
+              <a:rPr lang="en-US" sz="1800" dirty="0">
+                <a:latin typeface="Consolas" panose="020B0609020204030204" pitchFamily="49" charset="0"/>
+              </a:rPr>
               <a:t>or</a:t>
             </a:r>
           </a:p>
           <a:p>
             <a:pPr lvl="2"/>
             <a:r>
-              <a:rPr lang="en-US" dirty="0"/>
+              <a:rPr lang="en-US" dirty="0">
+                <a:latin typeface="Consolas" panose="020B0609020204030204" pitchFamily="49" charset="0"/>
+              </a:rPr>
               <a:t>order</a:t>
             </a:r>
           </a:p>
           <a:p>
             <a:pPr lvl="2"/>
             <a:r>
-              <a:rPr lang="en-US" dirty="0"/>
-              <a:t>skip, limit</a:t>
+              <a:rPr lang="en-US" dirty="0">
+                <a:latin typeface="Consolas" panose="020B0609020204030204" pitchFamily="49" charset="0"/>
+              </a:rPr>
+              <a:t>skip, take</a:t>
             </a:r>
           </a:p>
           <a:p>
             <a:pPr lvl="2"/>
             <a:r>
-              <a:rPr lang="en-US" dirty="0"/>
+              <a:rPr lang="en-US" dirty="0">
+                <a:latin typeface="Consolas" panose="020B0609020204030204" pitchFamily="49" charset="0"/>
+              </a:rPr>
               <a:t>Not, </a:t>
             </a:r>
             <a:r>
-              <a:rPr lang="en-US" dirty="0" err="1"/>
-              <a:t>lessThan</a:t>
-            </a:r>
-            <a:r>
-              <a:rPr lang="en-US" dirty="0"/>
+              <a:rPr lang="en-US" dirty="0" err="1">
+                <a:latin typeface="Consolas" panose="020B0609020204030204" pitchFamily="49" charset="0"/>
+              </a:rPr>
+              <a:t>LessThan</a:t>
+            </a:r>
+            <a:r>
+              <a:rPr lang="en-US" dirty="0">
+                <a:latin typeface="Consolas" panose="020B0609020204030204" pitchFamily="49" charset="0"/>
+              </a:rPr>
               <a:t>, </a:t>
             </a:r>
             <a:r>
-              <a:rPr lang="en-US" dirty="0" err="1"/>
-              <a:t>moreThan</a:t>
-            </a:r>
-            <a:r>
-              <a:rPr lang="en-US" dirty="0"/>
-              <a:t>, equal, Like, between, In, Raw</a:t>
+              <a:rPr lang="en-US" dirty="0" err="1">
+                <a:latin typeface="Consolas" panose="020B0609020204030204" pitchFamily="49" charset="0"/>
+              </a:rPr>
+              <a:t>MoreThan</a:t>
+            </a:r>
+            <a:r>
+              <a:rPr lang="en-US" dirty="0">
+                <a:latin typeface="Consolas" panose="020B0609020204030204" pitchFamily="49" charset="0"/>
+              </a:rPr>
+              <a:t>, Equal, Like, between, In, Raw</a:t>
             </a:r>
           </a:p>
         </p:txBody>
@@ -7686,319 +7623,6 @@
           <p:cNvPr id="2" name="Title 1">
             <a:extLst>
               <a:ext uri="{FF2B5EF4-FFF2-40B4-BE49-F238E27FC236}">
-                <a16:creationId xmlns:a16="http://schemas.microsoft.com/office/drawing/2014/main" id="{70D63839-212C-4A12-A7DA-3DA02ACD7C26}"/>
-              </a:ext>
-            </a:extLst>
-          </p:cNvPr>
-          <p:cNvSpPr>
-            <a:spLocks noGrp="1"/>
-          </p:cNvSpPr>
-          <p:nvPr>
-            <p:ph type="title"/>
-          </p:nvPr>
-        </p:nvSpPr>
-        <p:spPr/>
-        <p:txBody>
-          <a:bodyPr/>
-          <a:lstStyle/>
-          <a:p>
-            <a:r>
-              <a:rPr lang="en-US" dirty="0"/>
-              <a:t>Demo</a:t>
-            </a:r>
-            <a:endParaRPr lang="fa-IR" dirty="0"/>
-          </a:p>
-        </p:txBody>
-      </p:sp>
-      <p:sp>
-        <p:nvSpPr>
-          <p:cNvPr id="3" name="Content Placeholder 2">
-            <a:extLst>
-              <a:ext uri="{FF2B5EF4-FFF2-40B4-BE49-F238E27FC236}">
-                <a16:creationId xmlns:a16="http://schemas.microsoft.com/office/drawing/2014/main" id="{8DCCF2A0-DD32-4F7C-91C1-F9F64E19D564}"/>
-              </a:ext>
-            </a:extLst>
-          </p:cNvPr>
-          <p:cNvSpPr>
-            <a:spLocks noGrp="1"/>
-          </p:cNvSpPr>
-          <p:nvPr>
-            <p:ph idx="1"/>
-          </p:nvPr>
-        </p:nvSpPr>
-        <p:spPr/>
-        <p:txBody>
-          <a:bodyPr/>
-          <a:lstStyle/>
-          <a:p>
-            <a:r>
-              <a:rPr lang="en-US" dirty="0"/>
-              <a:t>Fetch</a:t>
-            </a:r>
-          </a:p>
-          <a:p>
-            <a:pPr lvl="1"/>
-            <a:r>
-              <a:rPr lang="en-US" dirty="0" err="1"/>
-              <a:t>queryBuilder</a:t>
-            </a:r>
-            <a:endParaRPr lang="en-US" dirty="0"/>
-          </a:p>
-          <a:p>
-            <a:pPr marL="1024128" indent="-219456" algn="l" rtl="0" eaLnBrk="1" latinLnBrk="0" hangingPunct="1">
-              <a:spcBef>
-                <a:spcPts val="432"/>
-              </a:spcBef>
-              <a:spcAft>
-                <a:spcPts val="600"/>
-              </a:spcAft>
-            </a:pPr>
-            <a:r>
-              <a:rPr lang="en-US" sz="1800" kern="1200" dirty="0">
-                <a:ln w="9525" cap="flat" cmpd="sng" algn="ctr">
-                  <a:solidFill>
-                    <a:srgbClr val="404040">
-                      <a:alpha val="10000"/>
-                    </a:srgbClr>
-                  </a:solidFill>
-                  <a:prstDash val="solid"/>
-                  <a:round/>
-                </a:ln>
-                <a:solidFill>
-                  <a:srgbClr val="F4EEDC"/>
-                </a:solidFill>
-                <a:effectLst>
-                  <a:outerShdw blurRad="9525" dist="25400" dir="14640000" algn="tl" rotWithShape="0">
-                    <a:schemeClr val="bg1">
-                      <a:alpha val="30000"/>
-                    </a:schemeClr>
-                  </a:outerShdw>
-                </a:effectLst>
-                <a:latin typeface="Segoe UI Black" panose="020B0A02040204020203" pitchFamily="34" charset="0"/>
-                <a:ea typeface="Segoe UI Black" panose="020B0A02040204020203" pitchFamily="34" charset="0"/>
-                <a:cs typeface="+mn-cs"/>
-              </a:rPr>
-              <a:t>select</a:t>
-            </a:r>
-            <a:endParaRPr lang="fa-IR" dirty="0">
-              <a:effectLst/>
-            </a:endParaRPr>
-          </a:p>
-          <a:p>
-            <a:pPr marL="1024128" indent="-219456" algn="l" rtl="0" eaLnBrk="1" latinLnBrk="0" hangingPunct="1">
-              <a:spcBef>
-                <a:spcPts val="432"/>
-              </a:spcBef>
-              <a:spcAft>
-                <a:spcPts val="600"/>
-              </a:spcAft>
-            </a:pPr>
-            <a:r>
-              <a:rPr lang="en-US" sz="1800" kern="1200" dirty="0">
-                <a:ln w="9525" cap="flat" cmpd="sng" algn="ctr">
-                  <a:solidFill>
-                    <a:srgbClr val="404040">
-                      <a:alpha val="10000"/>
-                    </a:srgbClr>
-                  </a:solidFill>
-                  <a:prstDash val="solid"/>
-                  <a:round/>
-                </a:ln>
-                <a:solidFill>
-                  <a:srgbClr val="F4EEDC"/>
-                </a:solidFill>
-                <a:effectLst>
-                  <a:outerShdw blurRad="9525" dist="25400" dir="14640000" algn="tl" rotWithShape="0">
-                    <a:schemeClr val="bg1">
-                      <a:alpha val="30000"/>
-                    </a:schemeClr>
-                  </a:outerShdw>
-                </a:effectLst>
-                <a:latin typeface="Segoe UI Black" panose="020B0A02040204020203" pitchFamily="34" charset="0"/>
-                <a:ea typeface="Segoe UI Black" panose="020B0A02040204020203" pitchFamily="34" charset="0"/>
-                <a:cs typeface="+mn-cs"/>
-              </a:rPr>
-              <a:t>where</a:t>
-            </a:r>
-            <a:endParaRPr lang="fa-IR" dirty="0">
-              <a:effectLst/>
-            </a:endParaRPr>
-          </a:p>
-          <a:p>
-            <a:pPr marL="1024128" indent="-219456" algn="l" rtl="0" eaLnBrk="1" latinLnBrk="0" hangingPunct="1">
-              <a:spcBef>
-                <a:spcPts val="432"/>
-              </a:spcBef>
-              <a:spcAft>
-                <a:spcPts val="600"/>
-              </a:spcAft>
-            </a:pPr>
-            <a:r>
-              <a:rPr lang="en-US" sz="1800" kern="1200" dirty="0">
-                <a:ln w="9525" cap="flat" cmpd="sng" algn="ctr">
-                  <a:solidFill>
-                    <a:srgbClr val="404040">
-                      <a:alpha val="10000"/>
-                    </a:srgbClr>
-                  </a:solidFill>
-                  <a:prstDash val="solid"/>
-                  <a:round/>
-                </a:ln>
-                <a:solidFill>
-                  <a:srgbClr val="F4EEDC"/>
-                </a:solidFill>
-                <a:effectLst>
-                  <a:outerShdw blurRad="9525" dist="25400" dir="14640000" algn="tl" rotWithShape="0">
-                    <a:schemeClr val="bg1">
-                      <a:alpha val="30000"/>
-                    </a:schemeClr>
-                  </a:outerShdw>
-                </a:effectLst>
-                <a:latin typeface="Segoe UI Black" panose="020B0A02040204020203" pitchFamily="34" charset="0"/>
-                <a:ea typeface="Segoe UI Black" panose="020B0A02040204020203" pitchFamily="34" charset="0"/>
-                <a:cs typeface="+mn-cs"/>
-              </a:rPr>
-              <a:t>join</a:t>
-            </a:r>
-            <a:endParaRPr lang="fa-IR" dirty="0">
-              <a:effectLst/>
-            </a:endParaRPr>
-          </a:p>
-          <a:p>
-            <a:pPr marL="1024128" indent="-219456" algn="l" rtl="0" eaLnBrk="1" latinLnBrk="0" hangingPunct="1">
-              <a:spcBef>
-                <a:spcPts val="432"/>
-              </a:spcBef>
-              <a:spcAft>
-                <a:spcPts val="600"/>
-              </a:spcAft>
-            </a:pPr>
-            <a:r>
-              <a:rPr lang="en-US" sz="1800" kern="1200" dirty="0" err="1">
-                <a:ln w="9525" cap="flat" cmpd="sng" algn="ctr">
-                  <a:solidFill>
-                    <a:srgbClr val="404040">
-                      <a:alpha val="10000"/>
-                    </a:srgbClr>
-                  </a:solidFill>
-                  <a:prstDash val="solid"/>
-                  <a:round/>
-                </a:ln>
-                <a:solidFill>
-                  <a:srgbClr val="F4EEDC"/>
-                </a:solidFill>
-                <a:effectLst>
-                  <a:outerShdw blurRad="9525" dist="25400" dir="14640000" algn="tl" rotWithShape="0">
-                    <a:schemeClr val="bg1">
-                      <a:alpha val="30000"/>
-                    </a:schemeClr>
-                  </a:outerShdw>
-                </a:effectLst>
-                <a:latin typeface="Segoe UI Black" panose="020B0A02040204020203" pitchFamily="34" charset="0"/>
-                <a:ea typeface="Segoe UI Black" panose="020B0A02040204020203" pitchFamily="34" charset="0"/>
-                <a:cs typeface="+mn-cs"/>
-              </a:rPr>
-              <a:t>getOne</a:t>
-            </a:r>
-            <a:endParaRPr lang="fa-IR" dirty="0">
-              <a:effectLst/>
-            </a:endParaRPr>
-          </a:p>
-        </p:txBody>
-      </p:sp>
-      <p:sp>
-        <p:nvSpPr>
-          <p:cNvPr id="4" name="Footer Placeholder 3">
-            <a:extLst>
-              <a:ext uri="{FF2B5EF4-FFF2-40B4-BE49-F238E27FC236}">
-                <a16:creationId xmlns:a16="http://schemas.microsoft.com/office/drawing/2014/main" id="{38BA3D22-FEAC-42B4-8212-2333887E887A}"/>
-              </a:ext>
-            </a:extLst>
-          </p:cNvPr>
-          <p:cNvSpPr>
-            <a:spLocks noGrp="1"/>
-          </p:cNvSpPr>
-          <p:nvPr>
-            <p:ph type="ftr" sz="quarter" idx="11"/>
-          </p:nvPr>
-        </p:nvSpPr>
-        <p:spPr/>
-        <p:txBody>
-          <a:bodyPr/>
-          <a:lstStyle/>
-          <a:p>
-            <a:r>
-              <a:rPr lang="en-US"/>
-              <a:t>ORM</a:t>
-            </a:r>
-            <a:endParaRPr lang="en-US" dirty="0"/>
-          </a:p>
-        </p:txBody>
-      </p:sp>
-      <p:sp>
-        <p:nvSpPr>
-          <p:cNvPr id="5" name="Slide Number Placeholder 4">
-            <a:extLst>
-              <a:ext uri="{FF2B5EF4-FFF2-40B4-BE49-F238E27FC236}">
-                <a16:creationId xmlns:a16="http://schemas.microsoft.com/office/drawing/2014/main" id="{796E8034-8C65-443F-B7F1-8EA2EF90698F}"/>
-              </a:ext>
-            </a:extLst>
-          </p:cNvPr>
-          <p:cNvSpPr>
-            <a:spLocks noGrp="1"/>
-          </p:cNvSpPr>
-          <p:nvPr>
-            <p:ph type="sldNum" sz="quarter" idx="12"/>
-          </p:nvPr>
-        </p:nvSpPr>
-        <p:spPr/>
-        <p:txBody>
-          <a:bodyPr/>
-          <a:lstStyle/>
-          <a:p>
-            <a:fld id="{3A98EE3D-8CD1-4C3F-BD1C-C98C9596463C}" type="slidenum">
-              <a:rPr lang="en-US" smtClean="0"/>
-              <a:t>6</a:t>
-            </a:fld>
-            <a:endParaRPr lang="en-US" dirty="0"/>
-          </a:p>
-        </p:txBody>
-      </p:sp>
-    </p:spTree>
-    <p:extLst>
-      <p:ext uri="{BB962C8B-B14F-4D97-AF65-F5344CB8AC3E}">
-        <p14:creationId xmlns:p14="http://schemas.microsoft.com/office/powerpoint/2010/main" val="2007021943"/>
-      </p:ext>
-    </p:extLst>
-  </p:cSld>
-  <p:clrMapOvr>
-    <a:masterClrMapping/>
-  </p:clrMapOvr>
-</p:sld>
-</file>
-
-<file path=ppt/slides/slide7.xml><?xml version="1.0" encoding="utf-8"?>
-<p:sld xmlns:a="http://schemas.openxmlformats.org/drawingml/2006/main" xmlns:r="http://schemas.openxmlformats.org/officeDocument/2006/relationships" xmlns:p="http://schemas.openxmlformats.org/presentationml/2006/main">
-  <p:cSld>
-    <p:spTree>
-      <p:nvGrpSpPr>
-        <p:cNvPr id="1" name=""/>
-        <p:cNvGrpSpPr/>
-        <p:nvPr/>
-      </p:nvGrpSpPr>
-      <p:grpSpPr>
-        <a:xfrm>
-          <a:off x="0" y="0"/>
-          <a:ext cx="0" cy="0"/>
-          <a:chOff x="0" y="0"/>
-          <a:chExt cx="0" cy="0"/>
-        </a:xfrm>
-      </p:grpSpPr>
-      <p:sp>
-        <p:nvSpPr>
-          <p:cNvPr id="2" name="Title 1">
-            <a:extLst>
-              <a:ext uri="{FF2B5EF4-FFF2-40B4-BE49-F238E27FC236}">
                 <a16:creationId xmlns:a16="http://schemas.microsoft.com/office/drawing/2014/main" id="{0E37C3E6-DA96-4EFE-92EA-12E87A43E0DB}"/>
               </a:ext>
             </a:extLst>
@@ -8103,7 +7727,7 @@
           <a:p>
             <a:fld id="{3A98EE3D-8CD1-4C3F-BD1C-C98C9596463C}" type="slidenum">
               <a:rPr lang="en-US" smtClean="0"/>
-              <a:t>7</a:t>
+              <a:t>6</a:t>
             </a:fld>
             <a:endParaRPr lang="en-US" dirty="0"/>
           </a:p>

</xml_diff>